<commit_message>
Renaming state to fishtanks
</commit_message>
<xml_diff>
--- a/PSCONFEU_Modules2017.pptx
+++ b/PSCONFEU_Modules2017.pptx
@@ -6,10 +6,10 @@
     <p:sldMasterId id="2147483809" r:id="rId2"/>
   </p:sldMasterIdLst>
   <p:notesMasterIdLst>
-    <p:notesMasterId r:id="rId16"/>
+    <p:notesMasterId r:id="rId18"/>
   </p:notesMasterIdLst>
   <p:handoutMasterIdLst>
-    <p:handoutMasterId r:id="rId17"/>
+    <p:handoutMasterId r:id="rId19"/>
   </p:handoutMasterIdLst>
   <p:sldIdLst>
     <p:sldId id="316" r:id="rId3"/>
@@ -19,12 +19,14 @@
     <p:sldId id="318" r:id="rId7"/>
     <p:sldId id="320" r:id="rId8"/>
     <p:sldId id="321" r:id="rId9"/>
-    <p:sldId id="310" r:id="rId10"/>
-    <p:sldId id="317" r:id="rId11"/>
-    <p:sldId id="302" r:id="rId12"/>
-    <p:sldId id="313" r:id="rId13"/>
-    <p:sldId id="314" r:id="rId14"/>
-    <p:sldId id="312" r:id="rId15"/>
+    <p:sldId id="322" r:id="rId10"/>
+    <p:sldId id="323" r:id="rId11"/>
+    <p:sldId id="310" r:id="rId12"/>
+    <p:sldId id="317" r:id="rId13"/>
+    <p:sldId id="302" r:id="rId14"/>
+    <p:sldId id="313" r:id="rId15"/>
+    <p:sldId id="314" r:id="rId16"/>
+    <p:sldId id="312" r:id="rId17"/>
   </p:sldIdLst>
   <p:sldSz cx="9144000" cy="6858000" type="screen4x3"/>
   <p:notesSz cx="7099300" cy="10234613"/>
@@ -4306,48 +4308,42 @@
             <p:ph type="title"/>
           </p:nvPr>
         </p:nvSpPr>
-        <p:spPr>
-          <a:xfrm>
-            <a:off x="0" y="908720"/>
-            <a:ext cx="9144000" cy="792088"/>
-          </a:xfrm>
-          <a:prstGeom prst="rect">
-            <a:avLst/>
-          </a:prstGeom>
-        </p:spPr>
+        <p:spPr/>
         <p:txBody>
           <a:bodyPr/>
           <a:lstStyle/>
           <a:p>
             <a:r>
               <a:rPr lang="de-DE" dirty="0"/>
-              <a:t>Summary</a:t>
+              <a:t>Demo</a:t>
             </a:r>
           </a:p>
         </p:txBody>
       </p:sp>
       <p:sp>
         <p:nvSpPr>
-          <p:cNvPr id="3" name="Inhaltsplatzhalter 2"/>
+          <p:cNvPr id="3" name="Textplatzhalter 2"/>
           <p:cNvSpPr>
             <a:spLocks noGrp="1"/>
           </p:cNvSpPr>
           <p:nvPr>
-            <p:ph idx="1"/>
+            <p:ph type="body" sz="quarter" idx="10"/>
           </p:nvPr>
         </p:nvSpPr>
         <p:spPr/>
         <p:txBody>
-          <a:bodyPr/>
+          <a:bodyPr>
+            <a:normAutofit/>
+          </a:bodyPr>
           <a:lstStyle/>
           <a:p>
             <a:r>
               <a:rPr lang="de-DE" dirty="0"/>
-              <a:t>Be a </a:t>
+              <a:t>Path </a:t>
             </a:r>
             <a:r>
               <a:rPr lang="de-DE" dirty="0" err="1"/>
-              <a:t>good</a:t>
+              <a:t>processing</a:t>
             </a:r>
             <a:r>
               <a:rPr lang="de-DE" dirty="0"/>
@@ -4355,77 +4351,15 @@
             </a:r>
             <a:r>
               <a:rPr lang="de-DE" dirty="0" err="1"/>
-              <a:t>citizen</a:t>
-            </a:r>
-            <a:r>
-              <a:rPr lang="de-DE" dirty="0"/>
-              <a:t> in </a:t>
-            </a:r>
-            <a:r>
-              <a:rPr lang="de-DE" dirty="0" err="1"/>
-              <a:t>the</a:t>
+              <a:t>and</a:t>
             </a:r>
             <a:r>
               <a:rPr lang="de-DE" dirty="0"/>
               <a:t> </a:t>
             </a:r>
             <a:r>
-              <a:rPr lang="de-DE" dirty="0" err="1"/>
-              <a:t>eco</a:t>
-            </a:r>
-            <a:r>
-              <a:rPr lang="de-DE" dirty="0"/>
-              <a:t>-system</a:t>
-            </a:r>
-          </a:p>
-          <a:p>
-            <a:r>
-              <a:rPr lang="de-DE" dirty="0"/>
-              <a:t>Try </a:t>
-            </a:r>
-            <a:r>
-              <a:rPr lang="de-DE" dirty="0" err="1"/>
-              <a:t>to</a:t>
-            </a:r>
-            <a:r>
-              <a:rPr lang="de-DE" dirty="0"/>
-              <a:t> </a:t>
-            </a:r>
-            <a:r>
-              <a:rPr lang="de-DE" dirty="0" err="1"/>
-              <a:t>walk</a:t>
-            </a:r>
-            <a:r>
-              <a:rPr lang="de-DE" dirty="0"/>
-              <a:t> a </a:t>
-            </a:r>
-            <a:r>
-              <a:rPr lang="de-DE" dirty="0" err="1"/>
-              <a:t>mile</a:t>
-            </a:r>
-            <a:r>
-              <a:rPr lang="de-DE" dirty="0"/>
-              <a:t> in </a:t>
-            </a:r>
-            <a:r>
-              <a:rPr lang="de-DE" dirty="0" err="1"/>
-              <a:t>your</a:t>
-            </a:r>
-            <a:r>
-              <a:rPr lang="de-DE" dirty="0"/>
-              <a:t> </a:t>
-            </a:r>
-            <a:r>
-              <a:rPr lang="de-DE" dirty="0" err="1"/>
-              <a:t>users</a:t>
-            </a:r>
-            <a:r>
-              <a:rPr lang="de-DE" dirty="0"/>
-              <a:t> </a:t>
-            </a:r>
-            <a:r>
-              <a:rPr lang="de-DE" dirty="0" err="1"/>
-              <a:t>shoes</a:t>
+              <a:rPr lang="de-DE"/>
+              <a:t>filtering</a:t>
             </a:r>
             <a:endParaRPr lang="de-DE" dirty="0"/>
           </a:p>
@@ -4434,7 +4368,7 @@
     </p:spTree>
     <p:extLst>
       <p:ext uri="{BB962C8B-B14F-4D97-AF65-F5344CB8AC3E}">
-        <p14:creationId xmlns:p14="http://schemas.microsoft.com/office/powerpoint/2010/main" val="3109724331"/>
+        <p14:creationId xmlns:p14="http://schemas.microsoft.com/office/powerpoint/2010/main" val="2040841989"/>
       </p:ext>
     </p:extLst>
   </p:cSld>
@@ -4475,7 +4409,7 @@
       </p:grpSpPr>
       <p:sp>
         <p:nvSpPr>
-          <p:cNvPr id="2" name="Inhaltsplatzhalter 1"/>
+          <p:cNvPr id="2" name="Content Placeholder 1"/>
           <p:cNvSpPr>
             <a:spLocks noGrp="1"/>
           </p:cNvSpPr>
@@ -4485,248 +4419,496 @@
         </p:nvSpPr>
         <p:spPr/>
         <p:txBody>
-          <a:bodyPr/>
+          <a:bodyPr>
+            <a:normAutofit fontScale="85000" lnSpcReduction="10000"/>
+          </a:bodyPr>
           <a:lstStyle/>
           <a:p>
             <a:r>
-              <a:rPr lang="de-DE" dirty="0" err="1"/>
-              <a:t>Now</a:t>
-            </a:r>
-            <a:r>
-              <a:rPr lang="de-DE" dirty="0"/>
-              <a:t>: 15 min break</a:t>
-            </a:r>
-          </a:p>
-          <a:p>
-            <a:endParaRPr lang="de-DE" dirty="0"/>
-          </a:p>
-          <a:p>
-            <a:r>
-              <a:rPr lang="de-DE" dirty="0"/>
-              <a:t>Grab a </a:t>
-            </a:r>
-            <a:r>
-              <a:rPr lang="de-DE" dirty="0" err="1"/>
-              <a:t>coffee</a:t>
-            </a:r>
-            <a:endParaRPr lang="de-DE" dirty="0"/>
-          </a:p>
-          <a:p>
-            <a:r>
-              <a:rPr lang="de-DE" dirty="0" err="1"/>
-              <a:t>Stay</a:t>
-            </a:r>
-            <a:r>
-              <a:rPr lang="de-DE" dirty="0"/>
+              <a:rPr lang="en-US" dirty="0">
+                <a:solidFill>
+                  <a:srgbClr val="006400"/>
+                </a:solidFill>
+                <a:latin typeface="Lucida Console" panose="020B0609040504020204" pitchFamily="49" charset="0"/>
+              </a:rPr>
+              <a:t># use this template for code samples</a:t>
+            </a:r>
+          </a:p>
+          <a:p>
+            <a:r>
+              <a:rPr lang="en-US" dirty="0">
+                <a:solidFill>
+                  <a:srgbClr val="006400"/>
+                </a:solidFill>
+                <a:latin typeface="Lucida Console" panose="020B0609040504020204" pitchFamily="49" charset="0"/>
+              </a:rPr>
+              <a:t># and follow these instructions to show perfectly</a:t>
+            </a:r>
+          </a:p>
+          <a:p>
+            <a:r>
+              <a:rPr lang="en-US" dirty="0">
+                <a:solidFill>
+                  <a:srgbClr val="006400"/>
+                </a:solidFill>
+                <a:latin typeface="Lucida Console" panose="020B0609040504020204" pitchFamily="49" charset="0"/>
+              </a:rPr>
+              <a:t># color-coded PowerShell code:</a:t>
+            </a:r>
+          </a:p>
+          <a:p>
+            <a:endParaRPr lang="en-US" dirty="0">
+              <a:solidFill>
+                <a:srgbClr val="006400"/>
+              </a:solidFill>
+              <a:latin typeface="Lucida Console" panose="020B0609040504020204" pitchFamily="49" charset="0"/>
+            </a:endParaRPr>
+          </a:p>
+          <a:p>
+            <a:r>
+              <a:rPr lang="en-US" dirty="0">
+                <a:solidFill>
+                  <a:srgbClr val="006400"/>
+                </a:solidFill>
+                <a:latin typeface="Lucida Console" panose="020B0609040504020204" pitchFamily="49" charset="0"/>
+              </a:rPr>
+              <a:t># paste code to PowerShell ISE, select it, and copy it</a:t>
+            </a:r>
+            <a:endParaRPr lang="en-US" dirty="0">
+              <a:solidFill>
+                <a:prstClr val="black"/>
+              </a:solidFill>
+              <a:latin typeface="Lucida Console" panose="020B0609040504020204" pitchFamily="49" charset="0"/>
+            </a:endParaRPr>
+          </a:p>
+          <a:p>
+            <a:r>
+              <a:rPr lang="en-US" dirty="0">
+                <a:solidFill>
+                  <a:srgbClr val="006400"/>
+                </a:solidFill>
+                <a:latin typeface="Lucida Console" panose="020B0609040504020204" pitchFamily="49" charset="0"/>
+              </a:rPr>
+              <a:t># to the clipboard</a:t>
+            </a:r>
+            <a:endParaRPr lang="en-US" dirty="0">
+              <a:solidFill>
+                <a:prstClr val="black"/>
+              </a:solidFill>
+              <a:latin typeface="Lucida Console" panose="020B0609040504020204" pitchFamily="49" charset="0"/>
+            </a:endParaRPr>
+          </a:p>
+          <a:p>
+            <a:r>
+              <a:rPr lang="en-US" dirty="0">
+                <a:solidFill>
+                  <a:srgbClr val="0000FF"/>
+                </a:solidFill>
+                <a:latin typeface="Lucida Console" panose="020B0609040504020204" pitchFamily="49" charset="0"/>
+              </a:rPr>
+              <a:t>Paste-Code</a:t>
+            </a:r>
+            <a:r>
+              <a:rPr lang="en-US" dirty="0">
+                <a:solidFill>
+                  <a:prstClr val="black"/>
+                </a:solidFill>
+                <a:latin typeface="Lucida Console" panose="020B0609040504020204" pitchFamily="49" charset="0"/>
+              </a:rPr>
               <a:t> </a:t>
             </a:r>
             <a:r>
-              <a:rPr lang="de-DE" dirty="0" err="1"/>
-              <a:t>here</a:t>
-            </a:r>
-            <a:r>
-              <a:rPr lang="de-DE" dirty="0"/>
+              <a:rPr lang="en-US" dirty="0">
+                <a:solidFill>
+                  <a:srgbClr val="000080"/>
+                </a:solidFill>
+                <a:latin typeface="Lucida Console" panose="020B0609040504020204" pitchFamily="49" charset="0"/>
+              </a:rPr>
+              <a:t>-</a:t>
+            </a:r>
+            <a:r>
+              <a:rPr lang="en-US" dirty="0" err="1">
+                <a:solidFill>
+                  <a:srgbClr val="000080"/>
+                </a:solidFill>
+                <a:latin typeface="Lucida Console" panose="020B0609040504020204" pitchFamily="49" charset="0"/>
+              </a:rPr>
+              <a:t>toISE</a:t>
+            </a:r>
+            <a:r>
+              <a:rPr lang="en-US" dirty="0">
+                <a:solidFill>
+                  <a:prstClr val="black"/>
+                </a:solidFill>
+                <a:latin typeface="Lucida Console" panose="020B0609040504020204" pitchFamily="49" charset="0"/>
+              </a:rPr>
               <a:t> </a:t>
             </a:r>
             <a:r>
-              <a:rPr lang="de-DE" dirty="0" err="1"/>
-              <a:t>to</a:t>
-            </a:r>
-            <a:r>
-              <a:rPr lang="de-DE" dirty="0"/>
+              <a:rPr lang="en-US" dirty="0">
+                <a:solidFill>
+                  <a:srgbClr val="A9A9A9"/>
+                </a:solidFill>
+                <a:latin typeface="Lucida Console" panose="020B0609040504020204" pitchFamily="49" charset="0"/>
+              </a:rPr>
+              <a:t>|</a:t>
+            </a:r>
+            <a:r>
+              <a:rPr lang="en-US" dirty="0">
+                <a:solidFill>
+                  <a:prstClr val="black"/>
+                </a:solidFill>
+                <a:latin typeface="Lucida Console" panose="020B0609040504020204" pitchFamily="49" charset="0"/>
+              </a:rPr>
               <a:t> </a:t>
             </a:r>
             <a:r>
-              <a:rPr lang="de-DE" dirty="0" err="1"/>
-              <a:t>enjoy</a:t>
-            </a:r>
-            <a:r>
-              <a:rPr lang="de-DE" dirty="0"/>
+              <a:rPr lang="en-US" dirty="0">
+                <a:solidFill>
+                  <a:srgbClr val="0000FF"/>
+                </a:solidFill>
+                <a:latin typeface="Lucida Console" panose="020B0609040504020204" pitchFamily="49" charset="0"/>
+              </a:rPr>
+              <a:t>Select-Code</a:t>
+            </a:r>
+            <a:r>
+              <a:rPr lang="en-US" dirty="0">
+                <a:solidFill>
+                  <a:prstClr val="black"/>
+                </a:solidFill>
+                <a:latin typeface="Lucida Console" panose="020B0609040504020204" pitchFamily="49" charset="0"/>
+              </a:rPr>
               <a:t> </a:t>
             </a:r>
             <a:r>
-              <a:rPr lang="de-DE" dirty="0" err="1"/>
-              <a:t>next</a:t>
-            </a:r>
-            <a:r>
-              <a:rPr lang="de-DE" dirty="0"/>
+              <a:rPr lang="en-US" dirty="0">
+                <a:solidFill>
+                  <a:srgbClr val="A9A9A9"/>
+                </a:solidFill>
+                <a:latin typeface="Lucida Console" panose="020B0609040504020204" pitchFamily="49" charset="0"/>
+              </a:rPr>
+              <a:t>|</a:t>
+            </a:r>
+            <a:r>
+              <a:rPr lang="en-US" dirty="0">
+                <a:solidFill>
+                  <a:prstClr val="black"/>
+                </a:solidFill>
+                <a:latin typeface="Lucida Console" panose="020B0609040504020204" pitchFamily="49" charset="0"/>
+              </a:rPr>
               <a:t> </a:t>
             </a:r>
             <a:r>
-              <a:rPr lang="de-DE" dirty="0" err="1"/>
-              <a:t>presentation</a:t>
-            </a:r>
-            <a:endParaRPr lang="de-DE" dirty="0"/>
-          </a:p>
-          <a:p>
-            <a:r>
-              <a:rPr lang="de-DE" dirty="0"/>
-              <a:t>Change </a:t>
-            </a:r>
-            <a:r>
-              <a:rPr lang="de-DE" dirty="0" err="1"/>
-              <a:t>track</a:t>
-            </a:r>
-            <a:r>
-              <a:rPr lang="de-DE" dirty="0"/>
+              <a:rPr lang="en-US" dirty="0">
+                <a:solidFill>
+                  <a:srgbClr val="0000FF"/>
+                </a:solidFill>
+                <a:latin typeface="Lucida Console" panose="020B0609040504020204" pitchFamily="49" charset="0"/>
+              </a:rPr>
+              <a:t>Copy-</a:t>
+            </a:r>
+            <a:r>
+              <a:rPr lang="en-US" dirty="0" err="1">
+                <a:solidFill>
+                  <a:srgbClr val="0000FF"/>
+                </a:solidFill>
+                <a:latin typeface="Lucida Console" panose="020B0609040504020204" pitchFamily="49" charset="0"/>
+              </a:rPr>
+              <a:t>ToClipboard</a:t>
+            </a:r>
+            <a:endParaRPr lang="en-US" dirty="0">
+              <a:solidFill>
+                <a:prstClr val="black"/>
+              </a:solidFill>
+              <a:latin typeface="Lucida Console" panose="020B0609040504020204" pitchFamily="49" charset="0"/>
+            </a:endParaRPr>
+          </a:p>
+          <a:p>
+            <a:endParaRPr lang="en-US" dirty="0">
+              <a:solidFill>
+                <a:prstClr val="black"/>
+              </a:solidFill>
+              <a:latin typeface="Lucida Console" panose="020B0609040504020204" pitchFamily="49" charset="0"/>
+            </a:endParaRPr>
+          </a:p>
+          <a:p>
+            <a:r>
+              <a:rPr lang="en-US" dirty="0">
+                <a:solidFill>
+                  <a:srgbClr val="006400"/>
+                </a:solidFill>
+                <a:latin typeface="Lucida Console" panose="020B0609040504020204" pitchFamily="49" charset="0"/>
+              </a:rPr>
+              <a:t># to insert it with full color coding into a slide,</a:t>
+            </a:r>
+            <a:endParaRPr lang="en-US" dirty="0">
+              <a:solidFill>
+                <a:prstClr val="black"/>
+              </a:solidFill>
+              <a:latin typeface="Lucida Console" panose="020B0609040504020204" pitchFamily="49" charset="0"/>
+            </a:endParaRPr>
+          </a:p>
+          <a:p>
+            <a:r>
+              <a:rPr lang="en-US" dirty="0">
+                <a:solidFill>
+                  <a:srgbClr val="006400"/>
+                </a:solidFill>
+                <a:latin typeface="Lucida Console" panose="020B0609040504020204" pitchFamily="49" charset="0"/>
+              </a:rPr>
+              <a:t># paste the code to your PPT slide. It will be black,</a:t>
+            </a:r>
+            <a:endParaRPr lang="en-US" dirty="0">
+              <a:solidFill>
+                <a:prstClr val="black"/>
+              </a:solidFill>
+              <a:latin typeface="Lucida Console" panose="020B0609040504020204" pitchFamily="49" charset="0"/>
+            </a:endParaRPr>
+          </a:p>
+          <a:p>
+            <a:r>
+              <a:rPr lang="en-US" dirty="0">
+                <a:solidFill>
+                  <a:srgbClr val="006400"/>
+                </a:solidFill>
+                <a:latin typeface="Lucida Console" panose="020B0609040504020204" pitchFamily="49" charset="0"/>
+              </a:rPr>
+              <a:t># and there is a </a:t>
+            </a:r>
+            <a:r>
+              <a:rPr lang="en-US" dirty="0" err="1">
+                <a:solidFill>
+                  <a:srgbClr val="006400"/>
+                </a:solidFill>
+                <a:latin typeface="Lucida Console" panose="020B0609040504020204" pitchFamily="49" charset="0"/>
+              </a:rPr>
+              <a:t>toolbutton</a:t>
+            </a:r>
+            <a:r>
+              <a:rPr lang="en-US" dirty="0">
+                <a:solidFill>
+                  <a:srgbClr val="006400"/>
+                </a:solidFill>
+                <a:latin typeface="Lucida Console" panose="020B0609040504020204" pitchFamily="49" charset="0"/>
+              </a:rPr>
+              <a:t> labelled (Ctrl) in PPT.</a:t>
+            </a:r>
+            <a:endParaRPr lang="en-US" dirty="0">
+              <a:solidFill>
+                <a:prstClr val="black"/>
+              </a:solidFill>
+              <a:latin typeface="Lucida Console" panose="020B0609040504020204" pitchFamily="49" charset="0"/>
+            </a:endParaRPr>
+          </a:p>
+          <a:p>
+            <a:r>
+              <a:rPr lang="en-US" dirty="0">
+                <a:solidFill>
+                  <a:srgbClr val="0000FF"/>
+                </a:solidFill>
+                <a:latin typeface="Lucida Console" panose="020B0609040504020204" pitchFamily="49" charset="0"/>
+              </a:rPr>
+              <a:t>Click-</a:t>
+            </a:r>
+            <a:r>
+              <a:rPr lang="en-US" dirty="0" err="1">
+                <a:solidFill>
+                  <a:srgbClr val="0000FF"/>
+                </a:solidFill>
+                <a:latin typeface="Lucida Console" panose="020B0609040504020204" pitchFamily="49" charset="0"/>
+              </a:rPr>
+              <a:t>ToolButton</a:t>
+            </a:r>
+            <a:r>
+              <a:rPr lang="en-US" dirty="0">
+                <a:solidFill>
+                  <a:prstClr val="black"/>
+                </a:solidFill>
+                <a:latin typeface="Lucida Console" panose="020B0609040504020204" pitchFamily="49" charset="0"/>
+              </a:rPr>
               <a:t> </a:t>
             </a:r>
             <a:r>
-              <a:rPr lang="de-DE" dirty="0" err="1"/>
-              <a:t>and</a:t>
-            </a:r>
-            <a:r>
-              <a:rPr lang="de-DE" dirty="0"/>
+              <a:rPr lang="en-US" dirty="0">
+                <a:solidFill>
+                  <a:srgbClr val="000080"/>
+                </a:solidFill>
+                <a:latin typeface="Lucida Console" panose="020B0609040504020204" pitchFamily="49" charset="0"/>
+              </a:rPr>
+              <a:t>-Choose</a:t>
+            </a:r>
+            <a:r>
+              <a:rPr lang="en-US" dirty="0">
+                <a:solidFill>
+                  <a:prstClr val="black"/>
+                </a:solidFill>
+                <a:latin typeface="Lucida Console" panose="020B0609040504020204" pitchFamily="49" charset="0"/>
+              </a:rPr>
               <a:t> </a:t>
             </a:r>
             <a:r>
-              <a:rPr lang="de-DE" dirty="0" err="1"/>
-              <a:t>switch</a:t>
-            </a:r>
-            <a:r>
-              <a:rPr lang="de-DE" dirty="0"/>
-              <a:t> </a:t>
-            </a:r>
-            <a:r>
-              <a:rPr lang="de-DE" dirty="0" err="1"/>
-              <a:t>to</a:t>
-            </a:r>
-            <a:r>
-              <a:rPr lang="de-DE" dirty="0"/>
-              <a:t> </a:t>
-            </a:r>
-            <a:r>
-              <a:rPr lang="de-DE" dirty="0" err="1"/>
-              <a:t>another</a:t>
-            </a:r>
-            <a:r>
-              <a:rPr lang="de-DE" dirty="0"/>
-              <a:t> </a:t>
-            </a:r>
-            <a:r>
-              <a:rPr lang="de-DE" dirty="0" err="1"/>
-              <a:t>room</a:t>
-            </a:r>
-            <a:endParaRPr lang="de-DE" dirty="0"/>
-          </a:p>
-          <a:p>
-            <a:endParaRPr lang="de-DE" dirty="0"/>
-          </a:p>
-          <a:p>
-            <a:r>
-              <a:rPr lang="de-DE" dirty="0" err="1"/>
-              <a:t>Ask</a:t>
-            </a:r>
-            <a:r>
-              <a:rPr lang="de-DE" dirty="0"/>
-              <a:t> </a:t>
-            </a:r>
-            <a:r>
-              <a:rPr lang="de-DE" dirty="0" err="1"/>
-              <a:t>me</a:t>
-            </a:r>
-            <a:r>
-              <a:rPr lang="de-DE" dirty="0"/>
-              <a:t> </a:t>
-            </a:r>
-            <a:r>
-              <a:rPr lang="de-DE" dirty="0" err="1"/>
-              <a:t>questions</a:t>
-            </a:r>
-            <a:r>
-              <a:rPr lang="de-DE" dirty="0"/>
-              <a:t> </a:t>
-            </a:r>
-            <a:r>
-              <a:rPr lang="de-DE" dirty="0" err="1"/>
-              <a:t>or</a:t>
-            </a:r>
-            <a:r>
-              <a:rPr lang="de-DE" dirty="0"/>
-              <a:t> </a:t>
-            </a:r>
-            <a:r>
-              <a:rPr lang="de-DE" dirty="0" err="1"/>
-              <a:t>meet</a:t>
-            </a:r>
-            <a:r>
-              <a:rPr lang="de-DE" dirty="0"/>
-              <a:t> </a:t>
-            </a:r>
-            <a:r>
-              <a:rPr lang="de-DE" dirty="0" err="1"/>
-              <a:t>me</a:t>
-            </a:r>
-            <a:r>
-              <a:rPr lang="de-DE" dirty="0"/>
-              <a:t> in a </a:t>
-            </a:r>
-            <a:r>
-              <a:rPr lang="de-DE" dirty="0" err="1"/>
-              <a:t>breakout</a:t>
-            </a:r>
-            <a:r>
-              <a:rPr lang="de-DE" dirty="0"/>
-              <a:t> </a:t>
-            </a:r>
-            <a:r>
-              <a:rPr lang="de-DE" dirty="0" err="1"/>
-              <a:t>session</a:t>
-            </a:r>
-            <a:r>
-              <a:rPr lang="de-DE" dirty="0"/>
-              <a:t> </a:t>
-            </a:r>
-            <a:r>
-              <a:rPr lang="de-DE" dirty="0" err="1"/>
-              <a:t>room</a:t>
-            </a:r>
-            <a:r>
-              <a:rPr lang="de-DE" dirty="0"/>
-              <a:t> </a:t>
-            </a:r>
-            <a:r>
-              <a:rPr lang="de-DE" dirty="0" err="1"/>
-              <a:t>afterwards</a:t>
-            </a:r>
-            <a:endParaRPr lang="de-DE" dirty="0"/>
-          </a:p>
-        </p:txBody>
-      </p:sp>
-      <p:sp>
-        <p:nvSpPr>
-          <p:cNvPr id="3" name="Titel 2"/>
-          <p:cNvSpPr>
-            <a:spLocks noGrp="1"/>
-          </p:cNvSpPr>
-          <p:nvPr>
-            <p:ph type="title"/>
-          </p:nvPr>
-        </p:nvSpPr>
-        <p:spPr/>
-        <p:txBody>
-          <a:bodyPr/>
-          <a:lstStyle/>
-          <a:p>
-            <a:r>
-              <a:rPr lang="de-DE" dirty="0"/>
-              <a:t>Next </a:t>
-            </a:r>
-            <a:r>
-              <a:rPr lang="de-DE" dirty="0" err="1"/>
-              <a:t>Steps</a:t>
-            </a:r>
-            <a:r>
-              <a:rPr lang="de-DE" dirty="0"/>
-              <a:t>...</a:t>
-            </a:r>
+              <a:rPr lang="en-US" dirty="0" err="1">
+                <a:solidFill>
+                  <a:srgbClr val="8A2BE2"/>
+                </a:solidFill>
+                <a:latin typeface="Lucida Console" panose="020B0609040504020204" pitchFamily="49" charset="0"/>
+              </a:rPr>
+              <a:t>SymbolWithClipboardAndBrush</a:t>
+            </a:r>
+            <a:endParaRPr lang="en-US" dirty="0">
+              <a:solidFill>
+                <a:prstClr val="black"/>
+              </a:solidFill>
+              <a:latin typeface="Lucida Console" panose="020B0609040504020204" pitchFamily="49" charset="0"/>
+            </a:endParaRPr>
+          </a:p>
+          <a:p>
+            <a:r>
+              <a:rPr lang="en-US" dirty="0">
+                <a:solidFill>
+                  <a:srgbClr val="006400"/>
+                </a:solidFill>
+                <a:latin typeface="Lucida Console" panose="020B0609040504020204" pitchFamily="49" charset="0"/>
+              </a:rPr>
+              <a:t># Click the </a:t>
+            </a:r>
+            <a:r>
+              <a:rPr lang="en-US" dirty="0" err="1">
+                <a:solidFill>
+                  <a:srgbClr val="006400"/>
+                </a:solidFill>
+                <a:latin typeface="Lucida Console" panose="020B0609040504020204" pitchFamily="49" charset="0"/>
+              </a:rPr>
+              <a:t>toolbutton</a:t>
+            </a:r>
+            <a:r>
+              <a:rPr lang="en-US" dirty="0">
+                <a:solidFill>
+                  <a:srgbClr val="006400"/>
+                </a:solidFill>
+                <a:latin typeface="Lucida Console" panose="020B0609040504020204" pitchFamily="49" charset="0"/>
+              </a:rPr>
+              <a:t>, and choose the button that shows</a:t>
+            </a:r>
+            <a:endParaRPr lang="en-US" dirty="0">
+              <a:solidFill>
+                <a:prstClr val="black"/>
+              </a:solidFill>
+              <a:latin typeface="Lucida Console" panose="020B0609040504020204" pitchFamily="49" charset="0"/>
+            </a:endParaRPr>
+          </a:p>
+          <a:p>
+            <a:r>
+              <a:rPr lang="en-US" dirty="0">
+                <a:solidFill>
+                  <a:srgbClr val="006400"/>
+                </a:solidFill>
+                <a:latin typeface="Lucida Console" panose="020B0609040504020204" pitchFamily="49" charset="0"/>
+              </a:rPr>
+              <a:t># a clipboard with a brush. This will add color coding</a:t>
+            </a:r>
+            <a:endParaRPr lang="en-US" dirty="0">
+              <a:solidFill>
+                <a:prstClr val="black"/>
+              </a:solidFill>
+              <a:latin typeface="Lucida Console" panose="020B0609040504020204" pitchFamily="49" charset="0"/>
+            </a:endParaRPr>
+          </a:p>
+          <a:p>
+            <a:r>
+              <a:rPr lang="en-US" dirty="0">
+                <a:solidFill>
+                  <a:srgbClr val="006400"/>
+                </a:solidFill>
+                <a:latin typeface="Lucida Console" panose="020B0609040504020204" pitchFamily="49" charset="0"/>
+              </a:rPr>
+              <a:t># back to the pasted code</a:t>
+            </a:r>
+          </a:p>
+          <a:p>
+            <a:endParaRPr lang="en-US" dirty="0">
+              <a:solidFill>
+                <a:srgbClr val="006400"/>
+              </a:solidFill>
+              <a:latin typeface="Lucida Console" panose="020B0609040504020204" pitchFamily="49" charset="0"/>
+            </a:endParaRPr>
+          </a:p>
+          <a:p>
+            <a:r>
+              <a:rPr lang="en-US" dirty="0">
+                <a:solidFill>
+                  <a:srgbClr val="FF0000"/>
+                </a:solidFill>
+                <a:latin typeface="Lucida Console" panose="020B0609040504020204" pitchFamily="49" charset="0"/>
+              </a:rPr>
+              <a:t>PLEASE NOTE: You do not need to use ISE to code, or to demo. Use whatever editor you like best. </a:t>
+            </a:r>
+          </a:p>
+          <a:p>
+            <a:endParaRPr lang="en-US" dirty="0">
+              <a:solidFill>
+                <a:srgbClr val="FF0000"/>
+              </a:solidFill>
+              <a:latin typeface="Lucida Console" panose="020B0609040504020204" pitchFamily="49" charset="0"/>
+            </a:endParaRPr>
+          </a:p>
+          <a:p>
+            <a:r>
+              <a:rPr lang="en-US" dirty="0">
+                <a:solidFill>
+                  <a:srgbClr val="FF0000"/>
+                </a:solidFill>
+                <a:latin typeface="Lucida Console" panose="020B0609040504020204" pitchFamily="49" charset="0"/>
+              </a:rPr>
+              <a:t>These steps use ISE to color-code your code correctly and consistently, and insert the color-coded code into the slide. Please help make all code look consistent. Many thanks!</a:t>
+            </a:r>
+          </a:p>
+          <a:p>
+            <a:endParaRPr lang="en-US" dirty="0">
+              <a:solidFill>
+                <a:srgbClr val="FF0000"/>
+              </a:solidFill>
+              <a:latin typeface="Lucida Console" panose="020B0609040504020204" pitchFamily="49" charset="0"/>
+            </a:endParaRPr>
+          </a:p>
+          <a:p>
+            <a:endParaRPr lang="en-US" dirty="0">
+              <a:solidFill>
+                <a:srgbClr val="FF0000"/>
+              </a:solidFill>
+              <a:latin typeface="Lucida Console" panose="020B0609040504020204" pitchFamily="49" charset="0"/>
+            </a:endParaRPr>
+          </a:p>
+          <a:p>
+            <a:endParaRPr lang="en-US" dirty="0">
+              <a:solidFill>
+                <a:srgbClr val="FF0000"/>
+              </a:solidFill>
+              <a:latin typeface="Lucida Console" panose="020B0609040504020204" pitchFamily="49" charset="0"/>
+            </a:endParaRPr>
+          </a:p>
+          <a:p>
+            <a:endParaRPr lang="en-US" dirty="0">
+              <a:solidFill>
+                <a:srgbClr val="FF0000"/>
+              </a:solidFill>
+              <a:latin typeface="Lucida Console" panose="020B0609040504020204" pitchFamily="49" charset="0"/>
+            </a:endParaRPr>
+          </a:p>
+          <a:p>
+            <a:endParaRPr lang="en-US" dirty="0">
+              <a:solidFill>
+                <a:srgbClr val="FF0000"/>
+              </a:solidFill>
+              <a:latin typeface="Lucida Console" panose="020B0609040504020204" pitchFamily="49" charset="0"/>
+            </a:endParaRPr>
           </a:p>
         </p:txBody>
       </p:sp>
     </p:spTree>
     <p:extLst>
       <p:ext uri="{BB962C8B-B14F-4D97-AF65-F5344CB8AC3E}">
-        <p14:creationId xmlns:p14="http://schemas.microsoft.com/office/powerpoint/2010/main" val="3397310615"/>
+        <p14:creationId xmlns:p14="http://schemas.microsoft.com/office/powerpoint/2010/main" val="1401421730"/>
       </p:ext>
     </p:extLst>
   </p:cSld>
@@ -4735,12 +4917,12 @@
   </p:clrMapOvr>
   <mc:AlternateContent xmlns:mc="http://schemas.openxmlformats.org/markup-compatibility/2006" xmlns:p14="http://schemas.microsoft.com/office/powerpoint/2010/main">
     <mc:Choice Requires="p14">
-      <p:transition spd="med" p14:dur="700">
-        <p:fade/>
+      <p:transition spd="slow" p14:dur="1300">
+        <p14:pan dir="u"/>
       </p:transition>
     </mc:Choice>
     <mc:Fallback xmlns="">
-      <p:transition spd="med">
+      <p:transition spd="slow">
         <p:fade/>
       </p:transition>
     </mc:Fallback>
@@ -4775,6 +4957,475 @@
             <p:ph type="title"/>
           </p:nvPr>
         </p:nvSpPr>
+        <p:spPr>
+          <a:xfrm>
+            <a:off x="0" y="908720"/>
+            <a:ext cx="9144000" cy="792088"/>
+          </a:xfrm>
+          <a:prstGeom prst="rect">
+            <a:avLst/>
+          </a:prstGeom>
+        </p:spPr>
+        <p:txBody>
+          <a:bodyPr/>
+          <a:lstStyle/>
+          <a:p>
+            <a:r>
+              <a:rPr lang="de-DE" dirty="0"/>
+              <a:t>Summary</a:t>
+            </a:r>
+          </a:p>
+        </p:txBody>
+      </p:sp>
+      <p:sp>
+        <p:nvSpPr>
+          <p:cNvPr id="3" name="Inhaltsplatzhalter 2"/>
+          <p:cNvSpPr>
+            <a:spLocks noGrp="1"/>
+          </p:cNvSpPr>
+          <p:nvPr>
+            <p:ph idx="1"/>
+          </p:nvPr>
+        </p:nvSpPr>
+        <p:spPr/>
+        <p:txBody>
+          <a:bodyPr/>
+          <a:lstStyle/>
+          <a:p>
+            <a:r>
+              <a:rPr lang="de-DE" dirty="0"/>
+              <a:t>Be a </a:t>
+            </a:r>
+            <a:r>
+              <a:rPr lang="de-DE" dirty="0" err="1"/>
+              <a:t>good</a:t>
+            </a:r>
+            <a:r>
+              <a:rPr lang="de-DE" dirty="0"/>
+              <a:t> </a:t>
+            </a:r>
+            <a:r>
+              <a:rPr lang="de-DE" dirty="0" err="1"/>
+              <a:t>citizen</a:t>
+            </a:r>
+            <a:r>
+              <a:rPr lang="de-DE" dirty="0"/>
+              <a:t> in </a:t>
+            </a:r>
+            <a:r>
+              <a:rPr lang="de-DE" dirty="0" err="1"/>
+              <a:t>the</a:t>
+            </a:r>
+            <a:r>
+              <a:rPr lang="de-DE" dirty="0"/>
+              <a:t> </a:t>
+            </a:r>
+            <a:r>
+              <a:rPr lang="de-DE" dirty="0" err="1"/>
+              <a:t>eco</a:t>
+            </a:r>
+            <a:r>
+              <a:rPr lang="de-DE" dirty="0"/>
+              <a:t>-system</a:t>
+            </a:r>
+          </a:p>
+          <a:p>
+            <a:r>
+              <a:rPr lang="de-DE" dirty="0"/>
+              <a:t>Try </a:t>
+            </a:r>
+            <a:r>
+              <a:rPr lang="de-DE" dirty="0" err="1"/>
+              <a:t>to</a:t>
+            </a:r>
+            <a:r>
+              <a:rPr lang="de-DE" dirty="0"/>
+              <a:t> </a:t>
+            </a:r>
+            <a:r>
+              <a:rPr lang="de-DE" dirty="0" err="1"/>
+              <a:t>walk</a:t>
+            </a:r>
+            <a:r>
+              <a:rPr lang="de-DE" dirty="0"/>
+              <a:t> a </a:t>
+            </a:r>
+            <a:r>
+              <a:rPr lang="de-DE" dirty="0" err="1"/>
+              <a:t>mile</a:t>
+            </a:r>
+            <a:r>
+              <a:rPr lang="de-DE" dirty="0"/>
+              <a:t> in </a:t>
+            </a:r>
+            <a:r>
+              <a:rPr lang="de-DE" dirty="0" err="1"/>
+              <a:t>your</a:t>
+            </a:r>
+            <a:r>
+              <a:rPr lang="de-DE" dirty="0"/>
+              <a:t> </a:t>
+            </a:r>
+            <a:r>
+              <a:rPr lang="de-DE" dirty="0" err="1"/>
+              <a:t>users</a:t>
+            </a:r>
+            <a:r>
+              <a:rPr lang="de-DE" dirty="0"/>
+              <a:t> </a:t>
+            </a:r>
+            <a:r>
+              <a:rPr lang="de-DE" dirty="0" err="1"/>
+              <a:t>shoes</a:t>
+            </a:r>
+            <a:endParaRPr lang="de-DE" dirty="0"/>
+          </a:p>
+        </p:txBody>
+      </p:sp>
+    </p:spTree>
+    <p:extLst>
+      <p:ext uri="{BB962C8B-B14F-4D97-AF65-F5344CB8AC3E}">
+        <p14:creationId xmlns:p14="http://schemas.microsoft.com/office/powerpoint/2010/main" val="3109724331"/>
+      </p:ext>
+    </p:extLst>
+  </p:cSld>
+  <p:clrMapOvr>
+    <a:masterClrMapping/>
+  </p:clrMapOvr>
+  <mc:AlternateContent xmlns:mc="http://schemas.openxmlformats.org/markup-compatibility/2006" xmlns:p14="http://schemas.microsoft.com/office/powerpoint/2010/main">
+    <mc:Choice Requires="p14">
+      <p:transition spd="med" p14:dur="700">
+        <p:fade/>
+      </p:transition>
+    </mc:Choice>
+    <mc:Fallback xmlns="">
+      <p:transition spd="med">
+        <p:fade/>
+      </p:transition>
+    </mc:Fallback>
+  </mc:AlternateContent>
+</p:sld>
+</file>
+
+<file path=ppt/slides/slide13.xml><?xml version="1.0" encoding="utf-8"?>
+<p:sld xmlns:a="http://schemas.openxmlformats.org/drawingml/2006/main" xmlns:r="http://schemas.openxmlformats.org/officeDocument/2006/relationships" xmlns:p="http://schemas.openxmlformats.org/presentationml/2006/main">
+  <p:cSld>
+    <p:spTree>
+      <p:nvGrpSpPr>
+        <p:cNvPr id="1" name=""/>
+        <p:cNvGrpSpPr/>
+        <p:nvPr/>
+      </p:nvGrpSpPr>
+      <p:grpSpPr>
+        <a:xfrm>
+          <a:off x="0" y="0"/>
+          <a:ext cx="0" cy="0"/>
+          <a:chOff x="0" y="0"/>
+          <a:chExt cx="0" cy="0"/>
+        </a:xfrm>
+      </p:grpSpPr>
+      <p:sp>
+        <p:nvSpPr>
+          <p:cNvPr id="2" name="Inhaltsplatzhalter 1"/>
+          <p:cNvSpPr>
+            <a:spLocks noGrp="1"/>
+          </p:cNvSpPr>
+          <p:nvPr>
+            <p:ph idx="1"/>
+          </p:nvPr>
+        </p:nvSpPr>
+        <p:spPr/>
+        <p:txBody>
+          <a:bodyPr/>
+          <a:lstStyle/>
+          <a:p>
+            <a:r>
+              <a:rPr lang="de-DE" dirty="0" err="1"/>
+              <a:t>Now</a:t>
+            </a:r>
+            <a:r>
+              <a:rPr lang="de-DE" dirty="0"/>
+              <a:t>: 15 min break</a:t>
+            </a:r>
+          </a:p>
+          <a:p>
+            <a:endParaRPr lang="de-DE" dirty="0"/>
+          </a:p>
+          <a:p>
+            <a:r>
+              <a:rPr lang="de-DE" dirty="0"/>
+              <a:t>Grab a </a:t>
+            </a:r>
+            <a:r>
+              <a:rPr lang="de-DE" dirty="0" err="1"/>
+              <a:t>coffee</a:t>
+            </a:r>
+            <a:endParaRPr lang="de-DE" dirty="0"/>
+          </a:p>
+          <a:p>
+            <a:r>
+              <a:rPr lang="de-DE" dirty="0" err="1"/>
+              <a:t>Stay</a:t>
+            </a:r>
+            <a:r>
+              <a:rPr lang="de-DE" dirty="0"/>
+              <a:t> </a:t>
+            </a:r>
+            <a:r>
+              <a:rPr lang="de-DE" dirty="0" err="1"/>
+              <a:t>here</a:t>
+            </a:r>
+            <a:r>
+              <a:rPr lang="de-DE" dirty="0"/>
+              <a:t> </a:t>
+            </a:r>
+            <a:r>
+              <a:rPr lang="de-DE" dirty="0" err="1"/>
+              <a:t>to</a:t>
+            </a:r>
+            <a:r>
+              <a:rPr lang="de-DE" dirty="0"/>
+              <a:t> </a:t>
+            </a:r>
+            <a:r>
+              <a:rPr lang="de-DE" dirty="0" err="1"/>
+              <a:t>enjoy</a:t>
+            </a:r>
+            <a:r>
+              <a:rPr lang="de-DE" dirty="0"/>
+              <a:t> </a:t>
+            </a:r>
+            <a:r>
+              <a:rPr lang="de-DE" dirty="0" err="1"/>
+              <a:t>next</a:t>
+            </a:r>
+            <a:r>
+              <a:rPr lang="de-DE" dirty="0"/>
+              <a:t> </a:t>
+            </a:r>
+            <a:r>
+              <a:rPr lang="de-DE" dirty="0" err="1"/>
+              <a:t>presentation</a:t>
+            </a:r>
+            <a:endParaRPr lang="de-DE" dirty="0"/>
+          </a:p>
+          <a:p>
+            <a:r>
+              <a:rPr lang="de-DE" dirty="0"/>
+              <a:t>Change </a:t>
+            </a:r>
+            <a:r>
+              <a:rPr lang="de-DE" dirty="0" err="1"/>
+              <a:t>track</a:t>
+            </a:r>
+            <a:r>
+              <a:rPr lang="de-DE" dirty="0"/>
+              <a:t> </a:t>
+            </a:r>
+            <a:r>
+              <a:rPr lang="de-DE" dirty="0" err="1"/>
+              <a:t>and</a:t>
+            </a:r>
+            <a:r>
+              <a:rPr lang="de-DE" dirty="0"/>
+              <a:t> </a:t>
+            </a:r>
+            <a:r>
+              <a:rPr lang="de-DE" dirty="0" err="1"/>
+              <a:t>switch</a:t>
+            </a:r>
+            <a:r>
+              <a:rPr lang="de-DE" dirty="0"/>
+              <a:t> </a:t>
+            </a:r>
+            <a:r>
+              <a:rPr lang="de-DE" dirty="0" err="1"/>
+              <a:t>to</a:t>
+            </a:r>
+            <a:r>
+              <a:rPr lang="de-DE" dirty="0"/>
+              <a:t> </a:t>
+            </a:r>
+            <a:r>
+              <a:rPr lang="de-DE" dirty="0" err="1"/>
+              <a:t>another</a:t>
+            </a:r>
+            <a:r>
+              <a:rPr lang="de-DE" dirty="0"/>
+              <a:t> </a:t>
+            </a:r>
+            <a:r>
+              <a:rPr lang="de-DE" dirty="0" err="1"/>
+              <a:t>room</a:t>
+            </a:r>
+            <a:endParaRPr lang="de-DE" dirty="0"/>
+          </a:p>
+          <a:p>
+            <a:endParaRPr lang="de-DE" dirty="0"/>
+          </a:p>
+          <a:p>
+            <a:r>
+              <a:rPr lang="de-DE" dirty="0" err="1"/>
+              <a:t>Ask</a:t>
+            </a:r>
+            <a:r>
+              <a:rPr lang="de-DE" dirty="0"/>
+              <a:t> </a:t>
+            </a:r>
+            <a:r>
+              <a:rPr lang="de-DE" dirty="0" err="1"/>
+              <a:t>me</a:t>
+            </a:r>
+            <a:r>
+              <a:rPr lang="de-DE" dirty="0"/>
+              <a:t> </a:t>
+            </a:r>
+            <a:r>
+              <a:rPr lang="de-DE" dirty="0" err="1"/>
+              <a:t>questions</a:t>
+            </a:r>
+            <a:r>
+              <a:rPr lang="de-DE" dirty="0"/>
+              <a:t> </a:t>
+            </a:r>
+            <a:r>
+              <a:rPr lang="de-DE" dirty="0" err="1"/>
+              <a:t>or</a:t>
+            </a:r>
+            <a:r>
+              <a:rPr lang="de-DE" dirty="0"/>
+              <a:t> </a:t>
+            </a:r>
+            <a:r>
+              <a:rPr lang="de-DE" dirty="0" err="1"/>
+              <a:t>meet</a:t>
+            </a:r>
+            <a:r>
+              <a:rPr lang="de-DE" dirty="0"/>
+              <a:t> </a:t>
+            </a:r>
+            <a:r>
+              <a:rPr lang="de-DE" dirty="0" err="1"/>
+              <a:t>me</a:t>
+            </a:r>
+            <a:r>
+              <a:rPr lang="de-DE" dirty="0"/>
+              <a:t> in a </a:t>
+            </a:r>
+            <a:r>
+              <a:rPr lang="de-DE" dirty="0" err="1"/>
+              <a:t>breakout</a:t>
+            </a:r>
+            <a:r>
+              <a:rPr lang="de-DE" dirty="0"/>
+              <a:t> </a:t>
+            </a:r>
+            <a:r>
+              <a:rPr lang="de-DE" dirty="0" err="1"/>
+              <a:t>session</a:t>
+            </a:r>
+            <a:r>
+              <a:rPr lang="de-DE" dirty="0"/>
+              <a:t> </a:t>
+            </a:r>
+            <a:r>
+              <a:rPr lang="de-DE" dirty="0" err="1"/>
+              <a:t>room</a:t>
+            </a:r>
+            <a:r>
+              <a:rPr lang="de-DE" dirty="0"/>
+              <a:t> </a:t>
+            </a:r>
+            <a:r>
+              <a:rPr lang="de-DE" dirty="0" err="1"/>
+              <a:t>afterwards</a:t>
+            </a:r>
+            <a:endParaRPr lang="de-DE" dirty="0"/>
+          </a:p>
+        </p:txBody>
+      </p:sp>
+      <p:sp>
+        <p:nvSpPr>
+          <p:cNvPr id="3" name="Titel 2"/>
+          <p:cNvSpPr>
+            <a:spLocks noGrp="1"/>
+          </p:cNvSpPr>
+          <p:nvPr>
+            <p:ph type="title"/>
+          </p:nvPr>
+        </p:nvSpPr>
+        <p:spPr/>
+        <p:txBody>
+          <a:bodyPr/>
+          <a:lstStyle/>
+          <a:p>
+            <a:r>
+              <a:rPr lang="de-DE" dirty="0"/>
+              <a:t>Next </a:t>
+            </a:r>
+            <a:r>
+              <a:rPr lang="de-DE" dirty="0" err="1"/>
+              <a:t>Steps</a:t>
+            </a:r>
+            <a:r>
+              <a:rPr lang="de-DE" dirty="0"/>
+              <a:t>...</a:t>
+            </a:r>
+          </a:p>
+        </p:txBody>
+      </p:sp>
+    </p:spTree>
+    <p:extLst>
+      <p:ext uri="{BB962C8B-B14F-4D97-AF65-F5344CB8AC3E}">
+        <p14:creationId xmlns:p14="http://schemas.microsoft.com/office/powerpoint/2010/main" val="3397310615"/>
+      </p:ext>
+    </p:extLst>
+  </p:cSld>
+  <p:clrMapOvr>
+    <a:masterClrMapping/>
+  </p:clrMapOvr>
+  <mc:AlternateContent xmlns:mc="http://schemas.openxmlformats.org/markup-compatibility/2006" xmlns:p14="http://schemas.microsoft.com/office/powerpoint/2010/main">
+    <mc:Choice Requires="p14">
+      <p:transition spd="med" p14:dur="700">
+        <p:fade/>
+      </p:transition>
+    </mc:Choice>
+    <mc:Fallback xmlns="">
+      <p:transition spd="med">
+        <p:fade/>
+      </p:transition>
+    </mc:Fallback>
+  </mc:AlternateContent>
+</p:sld>
+</file>
+
+<file path=ppt/slides/slide14.xml><?xml version="1.0" encoding="utf-8"?>
+<p:sld xmlns:a="http://schemas.openxmlformats.org/drawingml/2006/main" xmlns:r="http://schemas.openxmlformats.org/officeDocument/2006/relationships" xmlns:p="http://schemas.openxmlformats.org/presentationml/2006/main">
+  <p:cSld>
+    <p:spTree>
+      <p:nvGrpSpPr>
+        <p:cNvPr id="1" name=""/>
+        <p:cNvGrpSpPr/>
+        <p:nvPr/>
+      </p:nvGrpSpPr>
+      <p:grpSpPr>
+        <a:xfrm>
+          <a:off x="0" y="0"/>
+          <a:ext cx="0" cy="0"/>
+          <a:chOff x="0" y="0"/>
+          <a:chExt cx="0" cy="0"/>
+        </a:xfrm>
+      </p:grpSpPr>
+      <p:sp>
+        <p:nvSpPr>
+          <p:cNvPr id="2" name="Titel 1"/>
+          <p:cNvSpPr>
+            <a:spLocks noGrp="1"/>
+          </p:cNvSpPr>
+          <p:nvPr>
+            <p:ph type="title"/>
+          </p:nvPr>
+        </p:nvSpPr>
         <p:spPr/>
         <p:txBody>
           <a:bodyPr/>
@@ -4835,7 +5486,7 @@
 </p:sld>
 </file>
 
-<file path=ppt/slides/slide13.xml><?xml version="1.0" encoding="utf-8"?>
+<file path=ppt/slides/slide15.xml><?xml version="1.0" encoding="utf-8"?>
 <p:sld xmlns:a="http://schemas.openxmlformats.org/drawingml/2006/main" xmlns:r="http://schemas.openxmlformats.org/officeDocument/2006/relationships" xmlns:p="http://schemas.openxmlformats.org/presentationml/2006/main">
   <p:cSld>
     <p:spTree>
@@ -5271,6 +5922,29 @@
               <a:t>Naming</a:t>
             </a:r>
             <a:endParaRPr lang="de-DE" dirty="0"/>
+          </a:p>
+          <a:p>
+            <a:r>
+              <a:rPr lang="de-DE" dirty="0"/>
+              <a:t>Help</a:t>
+            </a:r>
+          </a:p>
+          <a:p>
+            <a:r>
+              <a:rPr lang="de-DE" dirty="0"/>
+              <a:t>Module </a:t>
+            </a:r>
+            <a:r>
+              <a:rPr lang="de-DE" dirty="0" err="1"/>
+              <a:t>metadata</a:t>
+            </a:r>
+            <a:endParaRPr lang="de-DE" dirty="0"/>
+          </a:p>
+          <a:p>
+            <a:r>
+              <a:rPr lang="de-DE" dirty="0"/>
+              <a:t>Tests</a:t>
+            </a:r>
           </a:p>
           <a:p>
             <a:endParaRPr lang="de-DE" dirty="0"/>
@@ -9359,11 +10033,7 @@
             <a:pPr lvl="1"/>
             <a:r>
               <a:rPr lang="en-US" dirty="0"/>
-              <a:t>PowerShell doesn’t have to load your module to see if the command the user typed is in </a:t>
-            </a:r>
-            <a:r>
-              <a:rPr lang="en-US"/>
-              <a:t>your module</a:t>
+              <a:t>PowerShell doesn’t have to load your module to see if the command the user typed is in your module</a:t>
             </a:r>
           </a:p>
         </p:txBody>
@@ -9434,7 +10104,43 @@
       </p:grpSpPr>
       <p:sp>
         <p:nvSpPr>
-          <p:cNvPr id="2" name="Titel 1"/>
+          <p:cNvPr id="2" name="Platshållare för innehåll 1"/>
+          <p:cNvSpPr>
+            <a:spLocks noGrp="1"/>
+          </p:cNvSpPr>
+          <p:nvPr>
+            <p:ph idx="1"/>
+          </p:nvPr>
+        </p:nvSpPr>
+        <p:spPr/>
+        <p:txBody>
+          <a:bodyPr/>
+          <a:lstStyle/>
+          <a:p>
+            <a:r>
+              <a:rPr lang="en-US" dirty="0"/>
+              <a:t>Pester has become the </a:t>
+            </a:r>
+            <a:r>
+              <a:rPr lang="en-US" dirty="0" err="1"/>
+              <a:t>defacto</a:t>
+            </a:r>
+            <a:r>
+              <a:rPr lang="en-US" dirty="0"/>
+              <a:t> standard for PowerShell test</a:t>
+            </a:r>
+          </a:p>
+          <a:p>
+            <a:r>
+              <a:rPr lang="en-US" dirty="0"/>
+              <a:t>Use it</a:t>
+            </a:r>
+          </a:p>
+        </p:txBody>
+      </p:sp>
+      <p:sp>
+        <p:nvSpPr>
+          <p:cNvPr id="3" name="Rubrik 2"/>
           <p:cNvSpPr>
             <a:spLocks noGrp="1"/>
           </p:cNvSpPr>
@@ -9448,320 +10154,8 @@
           <a:lstStyle/>
           <a:p>
             <a:r>
-              <a:rPr lang="de-DE" dirty="0"/>
-              <a:t>Demo</a:t>
-            </a:r>
-          </a:p>
-        </p:txBody>
-      </p:sp>
-      <p:sp>
-        <p:nvSpPr>
-          <p:cNvPr id="3" name="Textplatzhalter 2"/>
-          <p:cNvSpPr>
-            <a:spLocks noGrp="1"/>
-          </p:cNvSpPr>
-          <p:nvPr>
-            <p:ph type="body" sz="quarter" idx="10"/>
-          </p:nvPr>
-        </p:nvSpPr>
-        <p:spPr/>
-        <p:txBody>
-          <a:bodyPr>
-            <a:normAutofit fontScale="92500" lnSpcReduction="20000"/>
-          </a:bodyPr>
-          <a:lstStyle/>
-          <a:p>
-            <a:r>
-              <a:rPr lang="de-DE" dirty="0"/>
-              <a:t>Try </a:t>
-            </a:r>
-            <a:r>
-              <a:rPr lang="de-DE" dirty="0" err="1"/>
-              <a:t>and</a:t>
-            </a:r>
-            <a:r>
-              <a:rPr lang="de-DE" dirty="0"/>
-              <a:t> </a:t>
-            </a:r>
-            <a:r>
-              <a:rPr lang="de-DE" dirty="0" err="1"/>
-              <a:t>use</a:t>
-            </a:r>
-            <a:r>
-              <a:rPr lang="de-DE" dirty="0"/>
-              <a:t> </a:t>
-            </a:r>
-            <a:r>
-              <a:rPr lang="de-DE" dirty="0" err="1"/>
-              <a:t>demos</a:t>
-            </a:r>
-            <a:r>
-              <a:rPr lang="de-DE" dirty="0"/>
-              <a:t> </a:t>
-            </a:r>
-            <a:r>
-              <a:rPr lang="de-DE" dirty="0" err="1"/>
-              <a:t>instead</a:t>
-            </a:r>
-            <a:r>
-              <a:rPr lang="de-DE" dirty="0"/>
-              <a:t> </a:t>
-            </a:r>
-            <a:r>
-              <a:rPr lang="de-DE" dirty="0" err="1"/>
-              <a:t>of</a:t>
-            </a:r>
-            <a:r>
-              <a:rPr lang="de-DE" dirty="0"/>
-              <a:t> </a:t>
-            </a:r>
-            <a:r>
-              <a:rPr lang="de-DE" dirty="0" err="1"/>
-              <a:t>dead</a:t>
-            </a:r>
-            <a:r>
-              <a:rPr lang="de-DE" dirty="0"/>
-              <a:t> </a:t>
-            </a:r>
-            <a:r>
-              <a:rPr lang="de-DE" dirty="0" err="1"/>
-              <a:t>slides</a:t>
-            </a:r>
-            <a:r>
-              <a:rPr lang="de-DE" dirty="0"/>
-              <a:t>.</a:t>
-            </a:r>
-          </a:p>
-          <a:p>
-            <a:endParaRPr lang="de-DE" dirty="0"/>
-          </a:p>
-          <a:p>
-            <a:r>
-              <a:rPr lang="de-DE" dirty="0" err="1"/>
-              <a:t>Please</a:t>
-            </a:r>
-            <a:r>
-              <a:rPr lang="de-DE" dirty="0"/>
-              <a:t> do not </a:t>
-            </a:r>
-            <a:r>
-              <a:rPr lang="de-DE" dirty="0" err="1"/>
-              <a:t>dive</a:t>
-            </a:r>
-            <a:r>
-              <a:rPr lang="de-DE" dirty="0"/>
-              <a:t> </a:t>
-            </a:r>
-            <a:r>
-              <a:rPr lang="de-DE" dirty="0" err="1"/>
-              <a:t>into</a:t>
-            </a:r>
-            <a:r>
-              <a:rPr lang="de-DE" dirty="0"/>
-              <a:t> </a:t>
-            </a:r>
-            <a:r>
-              <a:rPr lang="de-DE" dirty="0" err="1"/>
-              <a:t>zillions</a:t>
-            </a:r>
-            <a:r>
-              <a:rPr lang="de-DE" dirty="0"/>
-              <a:t> </a:t>
-            </a:r>
-            <a:r>
-              <a:rPr lang="de-DE" dirty="0" err="1"/>
-              <a:t>of</a:t>
-            </a:r>
-            <a:r>
-              <a:rPr lang="de-DE" dirty="0"/>
-              <a:t> </a:t>
-            </a:r>
-            <a:r>
-              <a:rPr lang="de-DE" dirty="0" err="1"/>
-              <a:t>pages</a:t>
-            </a:r>
-            <a:r>
-              <a:rPr lang="de-DE" dirty="0"/>
-              <a:t> </a:t>
-            </a:r>
-            <a:r>
-              <a:rPr lang="de-DE" dirty="0" err="1"/>
-              <a:t>of</a:t>
-            </a:r>
-            <a:r>
-              <a:rPr lang="de-DE" dirty="0"/>
-              <a:t> </a:t>
-            </a:r>
-            <a:r>
-              <a:rPr lang="de-DE" dirty="0" err="1"/>
-              <a:t>code</a:t>
-            </a:r>
-            <a:r>
-              <a:rPr lang="de-DE" dirty="0"/>
-              <a:t>.</a:t>
-            </a:r>
-          </a:p>
-          <a:p>
-            <a:r>
-              <a:rPr lang="de-DE" dirty="0" err="1"/>
-              <a:t>Instead</a:t>
-            </a:r>
-            <a:r>
-              <a:rPr lang="de-DE" dirty="0"/>
-              <a:t>, </a:t>
-            </a:r>
-            <a:r>
-              <a:rPr lang="de-DE" dirty="0" err="1"/>
-              <a:t>if</a:t>
-            </a:r>
-            <a:r>
-              <a:rPr lang="de-DE" dirty="0"/>
-              <a:t> </a:t>
-            </a:r>
-            <a:r>
-              <a:rPr lang="de-DE" dirty="0" err="1"/>
-              <a:t>you</a:t>
-            </a:r>
-            <a:r>
-              <a:rPr lang="de-DE" dirty="0"/>
-              <a:t> </a:t>
-            </a:r>
-            <a:r>
-              <a:rPr lang="de-DE" dirty="0" err="1"/>
-              <a:t>can</a:t>
-            </a:r>
-            <a:r>
-              <a:rPr lang="de-DE" dirty="0"/>
-              <a:t>, turn </a:t>
-            </a:r>
-            <a:r>
-              <a:rPr lang="de-DE" dirty="0" err="1"/>
-              <a:t>your</a:t>
-            </a:r>
-            <a:r>
-              <a:rPr lang="de-DE" dirty="0"/>
-              <a:t> </a:t>
-            </a:r>
-            <a:r>
-              <a:rPr lang="de-DE" dirty="0" err="1"/>
-              <a:t>logical</a:t>
-            </a:r>
-            <a:r>
-              <a:rPr lang="de-DE" dirty="0"/>
-              <a:t> </a:t>
-            </a:r>
-            <a:r>
-              <a:rPr lang="de-DE" dirty="0" err="1"/>
-              <a:t>code</a:t>
-            </a:r>
-            <a:r>
-              <a:rPr lang="de-DE" dirty="0"/>
-              <a:t> </a:t>
-            </a:r>
-            <a:r>
-              <a:rPr lang="de-DE" dirty="0" err="1"/>
-              <a:t>blocks</a:t>
-            </a:r>
-            <a:r>
-              <a:rPr lang="de-DE" dirty="0"/>
-              <a:t> </a:t>
-            </a:r>
-            <a:r>
-              <a:rPr lang="de-DE" dirty="0" err="1"/>
-              <a:t>into</a:t>
-            </a:r>
-            <a:r>
-              <a:rPr lang="de-DE" dirty="0"/>
-              <a:t> </a:t>
-            </a:r>
-            <a:r>
-              <a:rPr lang="de-DE" dirty="0" err="1"/>
-              <a:t>functions</a:t>
-            </a:r>
-            <a:r>
-              <a:rPr lang="de-DE" dirty="0"/>
-              <a:t>, </a:t>
-            </a:r>
-            <a:r>
-              <a:rPr lang="de-DE" dirty="0" err="1"/>
-              <a:t>and</a:t>
-            </a:r>
-            <a:r>
-              <a:rPr lang="de-DE" dirty="0"/>
-              <a:t> </a:t>
-            </a:r>
-            <a:r>
-              <a:rPr lang="de-DE" dirty="0" err="1"/>
-              <a:t>store</a:t>
-            </a:r>
-            <a:r>
-              <a:rPr lang="de-DE" dirty="0"/>
-              <a:t> </a:t>
-            </a:r>
-            <a:r>
-              <a:rPr lang="de-DE" dirty="0" err="1"/>
-              <a:t>them</a:t>
-            </a:r>
-            <a:r>
-              <a:rPr lang="de-DE" dirty="0"/>
-              <a:t> in a </a:t>
-            </a:r>
-            <a:r>
-              <a:rPr lang="de-DE" dirty="0" err="1"/>
-              <a:t>module</a:t>
-            </a:r>
-            <a:r>
-              <a:rPr lang="de-DE" dirty="0"/>
-              <a:t>. </a:t>
-            </a:r>
-          </a:p>
-          <a:p>
-            <a:endParaRPr lang="de-DE" dirty="0"/>
-          </a:p>
-          <a:p>
-            <a:r>
-              <a:rPr lang="de-DE" dirty="0"/>
-              <a:t>Share </a:t>
-            </a:r>
-            <a:r>
-              <a:rPr lang="de-DE" dirty="0" err="1"/>
-              <a:t>this</a:t>
-            </a:r>
-            <a:r>
-              <a:rPr lang="de-DE" dirty="0"/>
-              <a:t> </a:t>
-            </a:r>
-            <a:r>
-              <a:rPr lang="de-DE" dirty="0" err="1"/>
-              <a:t>module</a:t>
-            </a:r>
-            <a:r>
-              <a:rPr lang="de-DE" dirty="0"/>
-              <a:t> </a:t>
-            </a:r>
-            <a:r>
-              <a:rPr lang="de-DE" dirty="0" err="1"/>
-              <a:t>with</a:t>
-            </a:r>
-            <a:r>
-              <a:rPr lang="de-DE" dirty="0"/>
-              <a:t> </a:t>
-            </a:r>
-            <a:r>
-              <a:rPr lang="de-DE" dirty="0" err="1"/>
-              <a:t>your</a:t>
-            </a:r>
-            <a:r>
-              <a:rPr lang="de-DE" dirty="0"/>
-              <a:t> </a:t>
-            </a:r>
-            <a:r>
-              <a:rPr lang="de-DE" dirty="0" err="1"/>
-              <a:t>audience</a:t>
-            </a:r>
-            <a:r>
-              <a:rPr lang="de-DE" dirty="0"/>
-              <a:t>.</a:t>
+              <a:rPr lang="en-US" dirty="0"/>
+              <a:t>Tests</a:t>
             </a:r>
           </a:p>
         </p:txBody>
@@ -9769,7 +10163,7 @@
     </p:spTree>
     <p:extLst>
       <p:ext uri="{BB962C8B-B14F-4D97-AF65-F5344CB8AC3E}">
-        <p14:creationId xmlns:p14="http://schemas.microsoft.com/office/powerpoint/2010/main" val="2040841989"/>
+        <p14:creationId xmlns:p14="http://schemas.microsoft.com/office/powerpoint/2010/main" val="3556032739"/>
       </p:ext>
     </p:extLst>
   </p:cSld>
@@ -9778,12 +10172,12 @@
   </p:clrMapOvr>
   <mc:AlternateContent xmlns:mc="http://schemas.openxmlformats.org/markup-compatibility/2006" xmlns:p14="http://schemas.microsoft.com/office/powerpoint/2010/main">
     <mc:Choice Requires="p14">
-      <p:transition spd="med" p14:dur="700">
-        <p:fade/>
+      <p:transition spd="slow" p14:dur="1300">
+        <p14:pan dir="u"/>
       </p:transition>
     </mc:Choice>
     <mc:Fallback xmlns="">
-      <p:transition spd="med">
+      <p:transition spd="slow">
         <p:fade/>
       </p:transition>
     </mc:Fallback>
@@ -9810,7 +10204,7 @@
       </p:grpSpPr>
       <p:sp>
         <p:nvSpPr>
-          <p:cNvPr id="2" name="Content Placeholder 1"/>
+          <p:cNvPr id="2" name="Platshållare för innehåll 1"/>
           <p:cNvSpPr>
             <a:spLocks noGrp="1"/>
           </p:cNvSpPr>
@@ -9820,496 +10214,76 @@
         </p:nvSpPr>
         <p:spPr/>
         <p:txBody>
-          <a:bodyPr>
-            <a:normAutofit fontScale="85000" lnSpcReduction="10000"/>
-          </a:bodyPr>
+          <a:bodyPr/>
           <a:lstStyle/>
           <a:p>
             <a:r>
-              <a:rPr lang="en-US" dirty="0">
-                <a:solidFill>
-                  <a:srgbClr val="006400"/>
-                </a:solidFill>
-                <a:latin typeface="Lucida Console" panose="020B0609040504020204" pitchFamily="49" charset="0"/>
-              </a:rPr>
-              <a:t># use this template for code samples</a:t>
-            </a:r>
-          </a:p>
-          <a:p>
-            <a:r>
-              <a:rPr lang="en-US" dirty="0">
-                <a:solidFill>
-                  <a:srgbClr val="006400"/>
-                </a:solidFill>
-                <a:latin typeface="Lucida Console" panose="020B0609040504020204" pitchFamily="49" charset="0"/>
-              </a:rPr>
-              <a:t># and follow these instructions to show perfectly</a:t>
-            </a:r>
-          </a:p>
-          <a:p>
-            <a:r>
-              <a:rPr lang="en-US" dirty="0">
-                <a:solidFill>
-                  <a:srgbClr val="006400"/>
-                </a:solidFill>
-                <a:latin typeface="Lucida Console" panose="020B0609040504020204" pitchFamily="49" charset="0"/>
-              </a:rPr>
-              <a:t># color-coded PowerShell code:</a:t>
-            </a:r>
-          </a:p>
-          <a:p>
-            <a:endParaRPr lang="en-US" dirty="0">
-              <a:solidFill>
-                <a:srgbClr val="006400"/>
-              </a:solidFill>
-              <a:latin typeface="Lucida Console" panose="020B0609040504020204" pitchFamily="49" charset="0"/>
-            </a:endParaRPr>
-          </a:p>
-          <a:p>
-            <a:r>
-              <a:rPr lang="en-US" dirty="0">
-                <a:solidFill>
-                  <a:srgbClr val="006400"/>
-                </a:solidFill>
-                <a:latin typeface="Lucida Console" panose="020B0609040504020204" pitchFamily="49" charset="0"/>
-              </a:rPr>
-              <a:t># paste code to PowerShell ISE, select it, and copy it</a:t>
-            </a:r>
-            <a:endParaRPr lang="en-US" dirty="0">
-              <a:solidFill>
-                <a:prstClr val="black"/>
-              </a:solidFill>
-              <a:latin typeface="Lucida Console" panose="020B0609040504020204" pitchFamily="49" charset="0"/>
-            </a:endParaRPr>
-          </a:p>
-          <a:p>
-            <a:r>
-              <a:rPr lang="en-US" dirty="0">
-                <a:solidFill>
-                  <a:srgbClr val="006400"/>
-                </a:solidFill>
-                <a:latin typeface="Lucida Console" panose="020B0609040504020204" pitchFamily="49" charset="0"/>
-              </a:rPr>
-              <a:t># to the clipboard</a:t>
-            </a:r>
-            <a:endParaRPr lang="en-US" dirty="0">
-              <a:solidFill>
-                <a:prstClr val="black"/>
-              </a:solidFill>
-              <a:latin typeface="Lucida Console" panose="020B0609040504020204" pitchFamily="49" charset="0"/>
-            </a:endParaRPr>
-          </a:p>
-          <a:p>
-            <a:r>
-              <a:rPr lang="en-US" dirty="0">
-                <a:solidFill>
-                  <a:srgbClr val="0000FF"/>
-                </a:solidFill>
-                <a:latin typeface="Lucida Console" panose="020B0609040504020204" pitchFamily="49" charset="0"/>
-              </a:rPr>
-              <a:t>Paste-Code</a:t>
-            </a:r>
-            <a:r>
-              <a:rPr lang="en-US" dirty="0">
-                <a:solidFill>
-                  <a:prstClr val="black"/>
-                </a:solidFill>
-                <a:latin typeface="Lucida Console" panose="020B0609040504020204" pitchFamily="49" charset="0"/>
-              </a:rPr>
-              <a:t> </a:t>
-            </a:r>
-            <a:r>
-              <a:rPr lang="en-US" dirty="0">
-                <a:solidFill>
-                  <a:srgbClr val="000080"/>
-                </a:solidFill>
-                <a:latin typeface="Lucida Console" panose="020B0609040504020204" pitchFamily="49" charset="0"/>
-              </a:rPr>
-              <a:t>-</a:t>
-            </a:r>
-            <a:r>
-              <a:rPr lang="en-US" dirty="0" err="1">
-                <a:solidFill>
-                  <a:srgbClr val="000080"/>
-                </a:solidFill>
-                <a:latin typeface="Lucida Console" panose="020B0609040504020204" pitchFamily="49" charset="0"/>
-              </a:rPr>
-              <a:t>toISE</a:t>
-            </a:r>
-            <a:r>
-              <a:rPr lang="en-US" dirty="0">
-                <a:solidFill>
-                  <a:prstClr val="black"/>
-                </a:solidFill>
-                <a:latin typeface="Lucida Console" panose="020B0609040504020204" pitchFamily="49" charset="0"/>
-              </a:rPr>
-              <a:t> </a:t>
-            </a:r>
-            <a:r>
-              <a:rPr lang="en-US" dirty="0">
-                <a:solidFill>
-                  <a:srgbClr val="A9A9A9"/>
-                </a:solidFill>
-                <a:latin typeface="Lucida Console" panose="020B0609040504020204" pitchFamily="49" charset="0"/>
-              </a:rPr>
-              <a:t>|</a:t>
-            </a:r>
-            <a:r>
-              <a:rPr lang="en-US" dirty="0">
-                <a:solidFill>
-                  <a:prstClr val="black"/>
-                </a:solidFill>
-                <a:latin typeface="Lucida Console" panose="020B0609040504020204" pitchFamily="49" charset="0"/>
-              </a:rPr>
-              <a:t> </a:t>
-            </a:r>
-            <a:r>
-              <a:rPr lang="en-US" dirty="0">
-                <a:solidFill>
-                  <a:srgbClr val="0000FF"/>
-                </a:solidFill>
-                <a:latin typeface="Lucida Console" panose="020B0609040504020204" pitchFamily="49" charset="0"/>
-              </a:rPr>
-              <a:t>Select-Code</a:t>
-            </a:r>
-            <a:r>
-              <a:rPr lang="en-US" dirty="0">
-                <a:solidFill>
-                  <a:prstClr val="black"/>
-                </a:solidFill>
-                <a:latin typeface="Lucida Console" panose="020B0609040504020204" pitchFamily="49" charset="0"/>
-              </a:rPr>
-              <a:t> </a:t>
-            </a:r>
-            <a:r>
-              <a:rPr lang="en-US" dirty="0">
-                <a:solidFill>
-                  <a:srgbClr val="A9A9A9"/>
-                </a:solidFill>
-                <a:latin typeface="Lucida Console" panose="020B0609040504020204" pitchFamily="49" charset="0"/>
-              </a:rPr>
-              <a:t>|</a:t>
-            </a:r>
-            <a:r>
-              <a:rPr lang="en-US" dirty="0">
-                <a:solidFill>
-                  <a:prstClr val="black"/>
-                </a:solidFill>
-                <a:latin typeface="Lucida Console" panose="020B0609040504020204" pitchFamily="49" charset="0"/>
-              </a:rPr>
-              <a:t> </a:t>
-            </a:r>
-            <a:r>
-              <a:rPr lang="en-US" dirty="0">
-                <a:solidFill>
-                  <a:srgbClr val="0000FF"/>
-                </a:solidFill>
-                <a:latin typeface="Lucida Console" panose="020B0609040504020204" pitchFamily="49" charset="0"/>
-              </a:rPr>
-              <a:t>Copy-</a:t>
-            </a:r>
-            <a:r>
-              <a:rPr lang="en-US" dirty="0" err="1">
-                <a:solidFill>
-                  <a:srgbClr val="0000FF"/>
-                </a:solidFill>
-                <a:latin typeface="Lucida Console" panose="020B0609040504020204" pitchFamily="49" charset="0"/>
-              </a:rPr>
-              <a:t>ToClipboard</a:t>
-            </a:r>
-            <a:endParaRPr lang="en-US" dirty="0">
-              <a:solidFill>
-                <a:prstClr val="black"/>
-              </a:solidFill>
-              <a:latin typeface="Lucida Console" panose="020B0609040504020204" pitchFamily="49" charset="0"/>
-            </a:endParaRPr>
-          </a:p>
-          <a:p>
-            <a:endParaRPr lang="en-US" dirty="0">
-              <a:solidFill>
-                <a:prstClr val="black"/>
-              </a:solidFill>
-              <a:latin typeface="Lucida Console" panose="020B0609040504020204" pitchFamily="49" charset="0"/>
-            </a:endParaRPr>
-          </a:p>
-          <a:p>
-            <a:r>
-              <a:rPr lang="en-US" dirty="0">
-                <a:solidFill>
-                  <a:srgbClr val="006400"/>
-                </a:solidFill>
-                <a:latin typeface="Lucida Console" panose="020B0609040504020204" pitchFamily="49" charset="0"/>
-              </a:rPr>
-              <a:t># to insert it with full color coding into a slide,</a:t>
-            </a:r>
-            <a:endParaRPr lang="en-US" dirty="0">
-              <a:solidFill>
-                <a:prstClr val="black"/>
-              </a:solidFill>
-              <a:latin typeface="Lucida Console" panose="020B0609040504020204" pitchFamily="49" charset="0"/>
-            </a:endParaRPr>
-          </a:p>
-          <a:p>
-            <a:r>
-              <a:rPr lang="en-US" dirty="0">
-                <a:solidFill>
-                  <a:srgbClr val="006400"/>
-                </a:solidFill>
-                <a:latin typeface="Lucida Console" panose="020B0609040504020204" pitchFamily="49" charset="0"/>
-              </a:rPr>
-              <a:t># paste the code to your PPT slide. It will be black,</a:t>
-            </a:r>
-            <a:endParaRPr lang="en-US" dirty="0">
-              <a:solidFill>
-                <a:prstClr val="black"/>
-              </a:solidFill>
-              <a:latin typeface="Lucida Console" panose="020B0609040504020204" pitchFamily="49" charset="0"/>
-            </a:endParaRPr>
-          </a:p>
-          <a:p>
-            <a:r>
-              <a:rPr lang="en-US" dirty="0">
-                <a:solidFill>
-                  <a:srgbClr val="006400"/>
-                </a:solidFill>
-                <a:latin typeface="Lucida Console" panose="020B0609040504020204" pitchFamily="49" charset="0"/>
-              </a:rPr>
-              <a:t># and there is a </a:t>
-            </a:r>
-            <a:r>
-              <a:rPr lang="en-US" dirty="0" err="1">
-                <a:solidFill>
-                  <a:srgbClr val="006400"/>
-                </a:solidFill>
-                <a:latin typeface="Lucida Console" panose="020B0609040504020204" pitchFamily="49" charset="0"/>
-              </a:rPr>
-              <a:t>toolbutton</a:t>
-            </a:r>
-            <a:r>
-              <a:rPr lang="en-US" dirty="0">
-                <a:solidFill>
-                  <a:srgbClr val="006400"/>
-                </a:solidFill>
-                <a:latin typeface="Lucida Console" panose="020B0609040504020204" pitchFamily="49" charset="0"/>
-              </a:rPr>
-              <a:t> labelled (Ctrl) in PPT.</a:t>
-            </a:r>
-            <a:endParaRPr lang="en-US" dirty="0">
-              <a:solidFill>
-                <a:prstClr val="black"/>
-              </a:solidFill>
-              <a:latin typeface="Lucida Console" panose="020B0609040504020204" pitchFamily="49" charset="0"/>
-            </a:endParaRPr>
-          </a:p>
-          <a:p>
-            <a:r>
-              <a:rPr lang="en-US" dirty="0">
-                <a:solidFill>
-                  <a:srgbClr val="0000FF"/>
-                </a:solidFill>
-                <a:latin typeface="Lucida Console" panose="020B0609040504020204" pitchFamily="49" charset="0"/>
-              </a:rPr>
-              <a:t>Click-</a:t>
-            </a:r>
-            <a:r>
-              <a:rPr lang="en-US" dirty="0" err="1">
-                <a:solidFill>
-                  <a:srgbClr val="0000FF"/>
-                </a:solidFill>
-                <a:latin typeface="Lucida Console" panose="020B0609040504020204" pitchFamily="49" charset="0"/>
-              </a:rPr>
-              <a:t>ToolButton</a:t>
-            </a:r>
-            <a:r>
-              <a:rPr lang="en-US" dirty="0">
-                <a:solidFill>
-                  <a:prstClr val="black"/>
-                </a:solidFill>
-                <a:latin typeface="Lucida Console" panose="020B0609040504020204" pitchFamily="49" charset="0"/>
-              </a:rPr>
-              <a:t> </a:t>
-            </a:r>
-            <a:r>
-              <a:rPr lang="en-US" dirty="0">
-                <a:solidFill>
-                  <a:srgbClr val="000080"/>
-                </a:solidFill>
-                <a:latin typeface="Lucida Console" panose="020B0609040504020204" pitchFamily="49" charset="0"/>
-              </a:rPr>
-              <a:t>-Choose</a:t>
-            </a:r>
-            <a:r>
-              <a:rPr lang="en-US" dirty="0">
-                <a:solidFill>
-                  <a:prstClr val="black"/>
-                </a:solidFill>
-                <a:latin typeface="Lucida Console" panose="020B0609040504020204" pitchFamily="49" charset="0"/>
-              </a:rPr>
-              <a:t> </a:t>
-            </a:r>
-            <a:r>
-              <a:rPr lang="en-US" dirty="0" err="1">
-                <a:solidFill>
-                  <a:srgbClr val="8A2BE2"/>
-                </a:solidFill>
-                <a:latin typeface="Lucida Console" panose="020B0609040504020204" pitchFamily="49" charset="0"/>
-              </a:rPr>
-              <a:t>SymbolWithClipboardAndBrush</a:t>
-            </a:r>
-            <a:endParaRPr lang="en-US" dirty="0">
-              <a:solidFill>
-                <a:prstClr val="black"/>
-              </a:solidFill>
-              <a:latin typeface="Lucida Console" panose="020B0609040504020204" pitchFamily="49" charset="0"/>
-            </a:endParaRPr>
-          </a:p>
-          <a:p>
-            <a:r>
-              <a:rPr lang="en-US" dirty="0">
-                <a:solidFill>
-                  <a:srgbClr val="006400"/>
-                </a:solidFill>
-                <a:latin typeface="Lucida Console" panose="020B0609040504020204" pitchFamily="49" charset="0"/>
-              </a:rPr>
-              <a:t># Click the </a:t>
-            </a:r>
-            <a:r>
-              <a:rPr lang="en-US" dirty="0" err="1">
-                <a:solidFill>
-                  <a:srgbClr val="006400"/>
-                </a:solidFill>
-                <a:latin typeface="Lucida Console" panose="020B0609040504020204" pitchFamily="49" charset="0"/>
-              </a:rPr>
-              <a:t>toolbutton</a:t>
-            </a:r>
-            <a:r>
-              <a:rPr lang="en-US" dirty="0">
-                <a:solidFill>
-                  <a:srgbClr val="006400"/>
-                </a:solidFill>
-                <a:latin typeface="Lucida Console" panose="020B0609040504020204" pitchFamily="49" charset="0"/>
-              </a:rPr>
-              <a:t>, and choose the button that shows</a:t>
-            </a:r>
-            <a:endParaRPr lang="en-US" dirty="0">
-              <a:solidFill>
-                <a:prstClr val="black"/>
-              </a:solidFill>
-              <a:latin typeface="Lucida Console" panose="020B0609040504020204" pitchFamily="49" charset="0"/>
-            </a:endParaRPr>
-          </a:p>
-          <a:p>
-            <a:r>
-              <a:rPr lang="en-US" dirty="0">
-                <a:solidFill>
-                  <a:srgbClr val="006400"/>
-                </a:solidFill>
-                <a:latin typeface="Lucida Console" panose="020B0609040504020204" pitchFamily="49" charset="0"/>
-              </a:rPr>
-              <a:t># a clipboard with a brush. This will add color coding</a:t>
-            </a:r>
-            <a:endParaRPr lang="en-US" dirty="0">
-              <a:solidFill>
-                <a:prstClr val="black"/>
-              </a:solidFill>
-              <a:latin typeface="Lucida Console" panose="020B0609040504020204" pitchFamily="49" charset="0"/>
-            </a:endParaRPr>
-          </a:p>
-          <a:p>
-            <a:r>
-              <a:rPr lang="en-US" dirty="0">
-                <a:solidFill>
-                  <a:srgbClr val="006400"/>
-                </a:solidFill>
-                <a:latin typeface="Lucida Console" panose="020B0609040504020204" pitchFamily="49" charset="0"/>
-              </a:rPr>
-              <a:t># back to the pasted code</a:t>
-            </a:r>
-          </a:p>
-          <a:p>
-            <a:endParaRPr lang="en-US" dirty="0">
-              <a:solidFill>
-                <a:srgbClr val="006400"/>
-              </a:solidFill>
-              <a:latin typeface="Lucida Console" panose="020B0609040504020204" pitchFamily="49" charset="0"/>
-            </a:endParaRPr>
-          </a:p>
-          <a:p>
-            <a:r>
-              <a:rPr lang="en-US" dirty="0">
-                <a:solidFill>
-                  <a:srgbClr val="FF0000"/>
-                </a:solidFill>
-                <a:latin typeface="Lucida Console" panose="020B0609040504020204" pitchFamily="49" charset="0"/>
-              </a:rPr>
-              <a:t>PLEASE NOTE: You do not need to use ISE to code, or to demo. Use whatever editor you like best. </a:t>
-            </a:r>
-          </a:p>
-          <a:p>
-            <a:endParaRPr lang="en-US" dirty="0">
-              <a:solidFill>
-                <a:srgbClr val="FF0000"/>
-              </a:solidFill>
-              <a:latin typeface="Lucida Console" panose="020B0609040504020204" pitchFamily="49" charset="0"/>
-            </a:endParaRPr>
-          </a:p>
-          <a:p>
-            <a:r>
-              <a:rPr lang="en-US" dirty="0">
-                <a:solidFill>
-                  <a:srgbClr val="FF0000"/>
-                </a:solidFill>
-                <a:latin typeface="Lucida Console" panose="020B0609040504020204" pitchFamily="49" charset="0"/>
-              </a:rPr>
-              <a:t>These steps use ISE to color-code your code correctly and consistently, and insert the color-coded code into the slide. Please help make all code look consistent. Many thanks!</a:t>
-            </a:r>
-          </a:p>
-          <a:p>
-            <a:endParaRPr lang="en-US" dirty="0">
-              <a:solidFill>
-                <a:srgbClr val="FF0000"/>
-              </a:solidFill>
-              <a:latin typeface="Lucida Console" panose="020B0609040504020204" pitchFamily="49" charset="0"/>
-            </a:endParaRPr>
-          </a:p>
-          <a:p>
-            <a:endParaRPr lang="en-US" dirty="0">
-              <a:solidFill>
-                <a:srgbClr val="FF0000"/>
-              </a:solidFill>
-              <a:latin typeface="Lucida Console" panose="020B0609040504020204" pitchFamily="49" charset="0"/>
-            </a:endParaRPr>
-          </a:p>
-          <a:p>
-            <a:endParaRPr lang="en-US" dirty="0">
-              <a:solidFill>
-                <a:srgbClr val="FF0000"/>
-              </a:solidFill>
-              <a:latin typeface="Lucida Console" panose="020B0609040504020204" pitchFamily="49" charset="0"/>
-            </a:endParaRPr>
-          </a:p>
-          <a:p>
-            <a:endParaRPr lang="en-US" dirty="0">
-              <a:solidFill>
-                <a:srgbClr val="FF0000"/>
-              </a:solidFill>
-              <a:latin typeface="Lucida Console" panose="020B0609040504020204" pitchFamily="49" charset="0"/>
-            </a:endParaRPr>
-          </a:p>
-          <a:p>
-            <a:endParaRPr lang="en-US" dirty="0">
-              <a:solidFill>
-                <a:srgbClr val="FF0000"/>
-              </a:solidFill>
-              <a:latin typeface="Lucida Console" panose="020B0609040504020204" pitchFamily="49" charset="0"/>
-            </a:endParaRPr>
+              <a:rPr lang="en-US" dirty="0"/>
+              <a:t>Resolving path</a:t>
+            </a:r>
+          </a:p>
+          <a:p>
+            <a:pPr lvl="1"/>
+            <a:r>
+              <a:rPr lang="en-US" dirty="0"/>
+              <a:t>Helper class </a:t>
+            </a:r>
+            <a:r>
+              <a:rPr lang="en-US" dirty="0" err="1"/>
+              <a:t>PathProcessor</a:t>
+            </a:r>
+            <a:endParaRPr lang="en-US" dirty="0"/>
+          </a:p>
+          <a:p>
+            <a:r>
+              <a:rPr lang="en-US" dirty="0"/>
+              <a:t>Filtering paths</a:t>
+            </a:r>
+          </a:p>
+          <a:p>
+            <a:pPr lvl="1"/>
+            <a:r>
+              <a:rPr lang="en-US" dirty="0"/>
+              <a:t>Helper class </a:t>
+            </a:r>
+            <a:r>
+              <a:rPr lang="en-US" dirty="0" err="1"/>
+              <a:t>IncludeExcludeFilter</a:t>
+            </a:r>
+            <a:endParaRPr lang="en-US" dirty="0"/>
+          </a:p>
+          <a:p>
+            <a:pPr lvl="1"/>
+            <a:endParaRPr lang="en-US" dirty="0"/>
+          </a:p>
+        </p:txBody>
+      </p:sp>
+      <p:sp>
+        <p:nvSpPr>
+          <p:cNvPr id="3" name="Rubrik 2"/>
+          <p:cNvSpPr>
+            <a:spLocks noGrp="1"/>
+          </p:cNvSpPr>
+          <p:nvPr>
+            <p:ph type="title"/>
+          </p:nvPr>
+        </p:nvSpPr>
+        <p:spPr/>
+        <p:txBody>
+          <a:bodyPr/>
+          <a:lstStyle/>
+          <a:p>
+            <a:r>
+              <a:rPr lang="en-US" dirty="0"/>
+              <a:t>Path processing and filtering</a:t>
+            </a:r>
           </a:p>
         </p:txBody>
       </p:sp>
     </p:spTree>
     <p:extLst>
       <p:ext uri="{BB962C8B-B14F-4D97-AF65-F5344CB8AC3E}">
-        <p14:creationId xmlns:p14="http://schemas.microsoft.com/office/powerpoint/2010/main" val="1401421730"/>
+        <p14:creationId xmlns:p14="http://schemas.microsoft.com/office/powerpoint/2010/main" val="793391273"/>
       </p:ext>
     </p:extLst>
   </p:cSld>

</xml_diff>